<commit_message>
Assigned presenters to slides
</commit_message>
<xml_diff>
--- a/Documents/4stones Presentation 2.pptx
+++ b/Documents/4stones Presentation 2.pptx
@@ -14,14 +14,14 @@
     <p:sldId id="256" r:id="rId2"/>
     <p:sldId id="262" r:id="rId3"/>
     <p:sldId id="259" r:id="rId4"/>
-    <p:sldId id="274" r:id="rId5"/>
-    <p:sldId id="272" r:id="rId6"/>
-    <p:sldId id="273" r:id="rId7"/>
-    <p:sldId id="263" r:id="rId8"/>
-    <p:sldId id="264" r:id="rId9"/>
-    <p:sldId id="275" r:id="rId10"/>
-    <p:sldId id="277" r:id="rId11"/>
-    <p:sldId id="278" r:id="rId12"/>
+    <p:sldId id="273" r:id="rId5"/>
+    <p:sldId id="263" r:id="rId6"/>
+    <p:sldId id="264" r:id="rId7"/>
+    <p:sldId id="275" r:id="rId8"/>
+    <p:sldId id="272" r:id="rId9"/>
+    <p:sldId id="274" r:id="rId10"/>
+    <p:sldId id="278" r:id="rId11"/>
+    <p:sldId id="277" r:id="rId12"/>
     <p:sldId id="276" r:id="rId13"/>
     <p:sldId id="279" r:id="rId14"/>
     <p:sldId id="269" r:id="rId15"/>
@@ -136,8 +136,6 @@
           <p14:sldIdLst>
             <p14:sldId id="262"/>
             <p14:sldId id="259"/>
-            <p14:sldId id="274"/>
-            <p14:sldId id="272"/>
             <p14:sldId id="273"/>
           </p14:sldIdLst>
         </p14:section>
@@ -145,15 +143,22 @@
           <p14:sldIdLst>
             <p14:sldId id="263"/>
             <p14:sldId id="264"/>
+          </p14:sldIdLst>
+        </p14:section>
+        <p14:section name="Technical Design" id="{13CAE6C5-BF58-43B8-AFC2-44044970F705}">
+          <p14:sldIdLst>
             <p14:sldId id="275"/>
+            <p14:sldId id="272"/>
+            <p14:sldId id="274"/>
+            <p14:sldId id="278"/>
             <p14:sldId id="277"/>
-            <p14:sldId id="278"/>
+          </p14:sldIdLst>
+        </p14:section>
+        <p14:section name="Testing" id="{212A2548-F50B-4C6D-A519-36233D924B71}">
+          <p14:sldIdLst>
             <p14:sldId id="276"/>
             <p14:sldId id="279"/>
           </p14:sldIdLst>
-        </p14:section>
-        <p14:section name="Design &amp; UX" id="{E96F6D4B-87B5-AF49-87A1-56E7AE170962}">
-          <p14:sldIdLst/>
         </p14:section>
         <p14:section name="Misc" id="{4F628B7E-5160-ED47-A4F9-F947C3CF10E8}">
           <p14:sldIdLst>
@@ -249,7 +254,7 @@
           <a:p>
             <a:fld id="{055BE44E-2112-C046-A58B-A65632D5DE13}" type="datetimeFigureOut">
               <a:rPr lang="en-US" smtClean="0"/>
-              <a:t>11/3/2014</a:t>
+              <a:t>11/4/2014</a:t>
             </a:fld>
             <a:endParaRPr lang="en-US"/>
           </a:p>
@@ -414,7 +419,7 @@
           <a:p>
             <a:fld id="{22ED3590-CF63-2C4B-8FB1-BF43FF5F305F}" type="datetimeFigureOut">
               <a:rPr lang="en-US" smtClean="0"/>
-              <a:t>11/3/2014</a:t>
+              <a:t>11/4/2014</a:t>
             </a:fld>
             <a:endParaRPr lang="en-US"/>
           </a:p>
@@ -731,7 +736,10 @@
           <a:bodyPr/>
           <a:lstStyle/>
           <a:p>
-            <a:endParaRPr lang="en-US"/>
+            <a:r>
+              <a:rPr lang="en-US" dirty="0" smtClean="0"/>
+              <a:t>Aaron</a:t>
+            </a:r>
           </a:p>
         </p:txBody>
       </p:sp>
@@ -762,6 +770,574 @@
     <p:extLst>
       <p:ext uri="{BB962C8B-B14F-4D97-AF65-F5344CB8AC3E}">
         <p14:creationId xmlns:p14="http://schemas.microsoft.com/office/powerpoint/2010/main" val="407083343"/>
+      </p:ext>
+    </p:extLst>
+  </p:cSld>
+  <p:clrMapOvr>
+    <a:masterClrMapping/>
+  </p:clrMapOvr>
+</p:notes>
+</file>
+
+<file path=ppt/notesSlides/notesSlide10.xml><?xml version="1.0" encoding="utf-8"?>
+<p:notes xmlns:a="http://schemas.openxmlformats.org/drawingml/2006/main" xmlns:r="http://schemas.openxmlformats.org/officeDocument/2006/relationships" xmlns:p="http://schemas.openxmlformats.org/presentationml/2006/main">
+  <p:cSld>
+    <p:spTree>
+      <p:nvGrpSpPr>
+        <p:cNvPr id="1" name=""/>
+        <p:cNvGrpSpPr/>
+        <p:nvPr/>
+      </p:nvGrpSpPr>
+      <p:grpSpPr>
+        <a:xfrm>
+          <a:off x="0" y="0"/>
+          <a:ext cx="0" cy="0"/>
+          <a:chOff x="0" y="0"/>
+          <a:chExt cx="0" cy="0"/>
+        </a:xfrm>
+      </p:grpSpPr>
+      <p:sp>
+        <p:nvSpPr>
+          <p:cNvPr id="2" name="Slide Image Placeholder 1"/>
+          <p:cNvSpPr>
+            <a:spLocks noGrp="1" noRot="1" noChangeAspect="1"/>
+          </p:cNvSpPr>
+          <p:nvPr>
+            <p:ph type="sldImg"/>
+          </p:nvPr>
+        </p:nvSpPr>
+        <p:spPr/>
+      </p:sp>
+      <p:sp>
+        <p:nvSpPr>
+          <p:cNvPr id="3" name="Notes Placeholder 2"/>
+          <p:cNvSpPr>
+            <a:spLocks noGrp="1"/>
+          </p:cNvSpPr>
+          <p:nvPr>
+            <p:ph type="body" idx="1"/>
+          </p:nvPr>
+        </p:nvSpPr>
+        <p:spPr/>
+        <p:txBody>
+          <a:bodyPr/>
+          <a:lstStyle/>
+          <a:p>
+            <a:pPr marL="0" marR="0" indent="0" algn="l" defTabSz="457200" rtl="0" eaLnBrk="1" fontAlgn="auto" latinLnBrk="0" hangingPunct="1">
+              <a:lnSpc>
+                <a:spcPct val="100000"/>
+              </a:lnSpc>
+              <a:spcBef>
+                <a:spcPts val="0"/>
+              </a:spcBef>
+              <a:spcAft>
+                <a:spcPts val="0"/>
+              </a:spcAft>
+              <a:buClrTx/>
+              <a:buSzTx/>
+              <a:buFontTx/>
+              <a:buNone/>
+              <a:tabLst/>
+              <a:defRPr/>
+            </a:pPr>
+            <a:r>
+              <a:rPr lang="en-US" dirty="0" smtClean="0"/>
+              <a:t>Aaron</a:t>
+            </a:r>
+          </a:p>
+          <a:p>
+            <a:endParaRPr lang="en-US" dirty="0"/>
+          </a:p>
+        </p:txBody>
+      </p:sp>
+      <p:sp>
+        <p:nvSpPr>
+          <p:cNvPr id="4" name="Slide Number Placeholder 3"/>
+          <p:cNvSpPr>
+            <a:spLocks noGrp="1"/>
+          </p:cNvSpPr>
+          <p:nvPr>
+            <p:ph type="sldNum" sz="quarter" idx="10"/>
+          </p:nvPr>
+        </p:nvSpPr>
+        <p:spPr/>
+        <p:txBody>
+          <a:bodyPr/>
+          <a:lstStyle/>
+          <a:p>
+            <a:fld id="{F8AFB5CC-0D84-5843-99AB-223961A97626}" type="slidenum">
+              <a:rPr lang="en-US" smtClean="0"/>
+              <a:t>10</a:t>
+            </a:fld>
+            <a:endParaRPr lang="en-US"/>
+          </a:p>
+        </p:txBody>
+      </p:sp>
+    </p:spTree>
+    <p:extLst>
+      <p:ext uri="{BB962C8B-B14F-4D97-AF65-F5344CB8AC3E}">
+        <p14:creationId xmlns:p14="http://schemas.microsoft.com/office/powerpoint/2010/main" val="2961876588"/>
+      </p:ext>
+    </p:extLst>
+  </p:cSld>
+  <p:clrMapOvr>
+    <a:masterClrMapping/>
+  </p:clrMapOvr>
+</p:notes>
+</file>
+
+<file path=ppt/notesSlides/notesSlide11.xml><?xml version="1.0" encoding="utf-8"?>
+<p:notes xmlns:a="http://schemas.openxmlformats.org/drawingml/2006/main" xmlns:r="http://schemas.openxmlformats.org/officeDocument/2006/relationships" xmlns:p="http://schemas.openxmlformats.org/presentationml/2006/main">
+  <p:cSld>
+    <p:spTree>
+      <p:nvGrpSpPr>
+        <p:cNvPr id="1" name=""/>
+        <p:cNvGrpSpPr/>
+        <p:nvPr/>
+      </p:nvGrpSpPr>
+      <p:grpSpPr>
+        <a:xfrm>
+          <a:off x="0" y="0"/>
+          <a:ext cx="0" cy="0"/>
+          <a:chOff x="0" y="0"/>
+          <a:chExt cx="0" cy="0"/>
+        </a:xfrm>
+      </p:grpSpPr>
+      <p:sp>
+        <p:nvSpPr>
+          <p:cNvPr id="2" name="Slide Image Placeholder 1"/>
+          <p:cNvSpPr>
+            <a:spLocks noGrp="1" noRot="1" noChangeAspect="1"/>
+          </p:cNvSpPr>
+          <p:nvPr>
+            <p:ph type="sldImg"/>
+          </p:nvPr>
+        </p:nvSpPr>
+        <p:spPr/>
+      </p:sp>
+      <p:sp>
+        <p:nvSpPr>
+          <p:cNvPr id="3" name="Notes Placeholder 2"/>
+          <p:cNvSpPr>
+            <a:spLocks noGrp="1"/>
+          </p:cNvSpPr>
+          <p:nvPr>
+            <p:ph type="body" idx="1"/>
+          </p:nvPr>
+        </p:nvSpPr>
+        <p:spPr/>
+        <p:txBody>
+          <a:bodyPr/>
+          <a:lstStyle/>
+          <a:p>
+            <a:pPr marL="0" marR="0" indent="0" algn="l" defTabSz="457200" rtl="0" eaLnBrk="1" fontAlgn="auto" latinLnBrk="0" hangingPunct="1">
+              <a:lnSpc>
+                <a:spcPct val="100000"/>
+              </a:lnSpc>
+              <a:spcBef>
+                <a:spcPts val="0"/>
+              </a:spcBef>
+              <a:spcAft>
+                <a:spcPts val="0"/>
+              </a:spcAft>
+              <a:buClrTx/>
+              <a:buSzTx/>
+              <a:buFontTx/>
+              <a:buNone/>
+              <a:tabLst/>
+              <a:defRPr/>
+            </a:pPr>
+            <a:r>
+              <a:rPr lang="en-US" dirty="0" smtClean="0"/>
+              <a:t>Aaron</a:t>
+            </a:r>
+          </a:p>
+        </p:txBody>
+      </p:sp>
+      <p:sp>
+        <p:nvSpPr>
+          <p:cNvPr id="4" name="Slide Number Placeholder 3"/>
+          <p:cNvSpPr>
+            <a:spLocks noGrp="1"/>
+          </p:cNvSpPr>
+          <p:nvPr>
+            <p:ph type="sldNum" sz="quarter" idx="10"/>
+          </p:nvPr>
+        </p:nvSpPr>
+        <p:spPr/>
+        <p:txBody>
+          <a:bodyPr/>
+          <a:lstStyle/>
+          <a:p>
+            <a:fld id="{F8AFB5CC-0D84-5843-99AB-223961A97626}" type="slidenum">
+              <a:rPr lang="en-US" smtClean="0"/>
+              <a:t>11</a:t>
+            </a:fld>
+            <a:endParaRPr lang="en-US"/>
+          </a:p>
+        </p:txBody>
+      </p:sp>
+    </p:spTree>
+    <p:extLst>
+      <p:ext uri="{BB962C8B-B14F-4D97-AF65-F5344CB8AC3E}">
+        <p14:creationId xmlns:p14="http://schemas.microsoft.com/office/powerpoint/2010/main" val="194169450"/>
+      </p:ext>
+    </p:extLst>
+  </p:cSld>
+  <p:clrMapOvr>
+    <a:masterClrMapping/>
+  </p:clrMapOvr>
+</p:notes>
+</file>
+
+<file path=ppt/notesSlides/notesSlide12.xml><?xml version="1.0" encoding="utf-8"?>
+<p:notes xmlns:a="http://schemas.openxmlformats.org/drawingml/2006/main" xmlns:r="http://schemas.openxmlformats.org/officeDocument/2006/relationships" xmlns:p="http://schemas.openxmlformats.org/presentationml/2006/main">
+  <p:cSld>
+    <p:spTree>
+      <p:nvGrpSpPr>
+        <p:cNvPr id="1" name=""/>
+        <p:cNvGrpSpPr/>
+        <p:nvPr/>
+      </p:nvGrpSpPr>
+      <p:grpSpPr>
+        <a:xfrm>
+          <a:off x="0" y="0"/>
+          <a:ext cx="0" cy="0"/>
+          <a:chOff x="0" y="0"/>
+          <a:chExt cx="0" cy="0"/>
+        </a:xfrm>
+      </p:grpSpPr>
+      <p:sp>
+        <p:nvSpPr>
+          <p:cNvPr id="2" name="Slide Image Placeholder 1"/>
+          <p:cNvSpPr>
+            <a:spLocks noGrp="1" noRot="1" noChangeAspect="1"/>
+          </p:cNvSpPr>
+          <p:nvPr>
+            <p:ph type="sldImg"/>
+          </p:nvPr>
+        </p:nvSpPr>
+        <p:spPr/>
+      </p:sp>
+      <p:sp>
+        <p:nvSpPr>
+          <p:cNvPr id="3" name="Notes Placeholder 2"/>
+          <p:cNvSpPr>
+            <a:spLocks noGrp="1"/>
+          </p:cNvSpPr>
+          <p:nvPr>
+            <p:ph type="body" idx="1"/>
+          </p:nvPr>
+        </p:nvSpPr>
+        <p:spPr/>
+        <p:txBody>
+          <a:bodyPr/>
+          <a:lstStyle/>
+          <a:p>
+            <a:r>
+              <a:rPr lang="en-US" dirty="0" smtClean="0"/>
+              <a:t>Ernest</a:t>
+            </a:r>
+            <a:endParaRPr lang="en-US" dirty="0"/>
+          </a:p>
+        </p:txBody>
+      </p:sp>
+      <p:sp>
+        <p:nvSpPr>
+          <p:cNvPr id="4" name="Slide Number Placeholder 3"/>
+          <p:cNvSpPr>
+            <a:spLocks noGrp="1"/>
+          </p:cNvSpPr>
+          <p:nvPr>
+            <p:ph type="sldNum" sz="quarter" idx="10"/>
+          </p:nvPr>
+        </p:nvSpPr>
+        <p:spPr/>
+        <p:txBody>
+          <a:bodyPr/>
+          <a:lstStyle/>
+          <a:p>
+            <a:fld id="{F8AFB5CC-0D84-5843-99AB-223961A97626}" type="slidenum">
+              <a:rPr lang="en-US" smtClean="0"/>
+              <a:t>12</a:t>
+            </a:fld>
+            <a:endParaRPr lang="en-US"/>
+          </a:p>
+        </p:txBody>
+      </p:sp>
+    </p:spTree>
+    <p:extLst>
+      <p:ext uri="{BB962C8B-B14F-4D97-AF65-F5344CB8AC3E}">
+        <p14:creationId xmlns:p14="http://schemas.microsoft.com/office/powerpoint/2010/main" val="3236922056"/>
+      </p:ext>
+    </p:extLst>
+  </p:cSld>
+  <p:clrMapOvr>
+    <a:masterClrMapping/>
+  </p:clrMapOvr>
+</p:notes>
+</file>
+
+<file path=ppt/notesSlides/notesSlide13.xml><?xml version="1.0" encoding="utf-8"?>
+<p:notes xmlns:a="http://schemas.openxmlformats.org/drawingml/2006/main" xmlns:r="http://schemas.openxmlformats.org/officeDocument/2006/relationships" xmlns:p="http://schemas.openxmlformats.org/presentationml/2006/main">
+  <p:cSld>
+    <p:spTree>
+      <p:nvGrpSpPr>
+        <p:cNvPr id="1" name=""/>
+        <p:cNvGrpSpPr/>
+        <p:nvPr/>
+      </p:nvGrpSpPr>
+      <p:grpSpPr>
+        <a:xfrm>
+          <a:off x="0" y="0"/>
+          <a:ext cx="0" cy="0"/>
+          <a:chOff x="0" y="0"/>
+          <a:chExt cx="0" cy="0"/>
+        </a:xfrm>
+      </p:grpSpPr>
+      <p:sp>
+        <p:nvSpPr>
+          <p:cNvPr id="2" name="Slide Image Placeholder 1"/>
+          <p:cNvSpPr>
+            <a:spLocks noGrp="1" noRot="1" noChangeAspect="1"/>
+          </p:cNvSpPr>
+          <p:nvPr>
+            <p:ph type="sldImg"/>
+          </p:nvPr>
+        </p:nvSpPr>
+        <p:spPr/>
+      </p:sp>
+      <p:sp>
+        <p:nvSpPr>
+          <p:cNvPr id="3" name="Notes Placeholder 2"/>
+          <p:cNvSpPr>
+            <a:spLocks noGrp="1"/>
+          </p:cNvSpPr>
+          <p:nvPr>
+            <p:ph type="body" idx="1"/>
+          </p:nvPr>
+        </p:nvSpPr>
+        <p:spPr/>
+        <p:txBody>
+          <a:bodyPr/>
+          <a:lstStyle/>
+          <a:p>
+            <a:r>
+              <a:rPr lang="en-US" dirty="0" smtClean="0"/>
+              <a:t>Ernest</a:t>
+            </a:r>
+            <a:endParaRPr lang="en-US" dirty="0"/>
+          </a:p>
+        </p:txBody>
+      </p:sp>
+      <p:sp>
+        <p:nvSpPr>
+          <p:cNvPr id="4" name="Slide Number Placeholder 3"/>
+          <p:cNvSpPr>
+            <a:spLocks noGrp="1"/>
+          </p:cNvSpPr>
+          <p:nvPr>
+            <p:ph type="sldNum" sz="quarter" idx="10"/>
+          </p:nvPr>
+        </p:nvSpPr>
+        <p:spPr/>
+        <p:txBody>
+          <a:bodyPr/>
+          <a:lstStyle/>
+          <a:p>
+            <a:fld id="{F8AFB5CC-0D84-5843-99AB-223961A97626}" type="slidenum">
+              <a:rPr lang="en-US" smtClean="0"/>
+              <a:t>13</a:t>
+            </a:fld>
+            <a:endParaRPr lang="en-US"/>
+          </a:p>
+        </p:txBody>
+      </p:sp>
+    </p:spTree>
+    <p:extLst>
+      <p:ext uri="{BB962C8B-B14F-4D97-AF65-F5344CB8AC3E}">
+        <p14:creationId xmlns:p14="http://schemas.microsoft.com/office/powerpoint/2010/main" val="1839774552"/>
+      </p:ext>
+    </p:extLst>
+  </p:cSld>
+  <p:clrMapOvr>
+    <a:masterClrMapping/>
+  </p:clrMapOvr>
+</p:notes>
+</file>
+
+<file path=ppt/notesSlides/notesSlide14.xml><?xml version="1.0" encoding="utf-8"?>
+<p:notes xmlns:a="http://schemas.openxmlformats.org/drawingml/2006/main" xmlns:r="http://schemas.openxmlformats.org/officeDocument/2006/relationships" xmlns:p="http://schemas.openxmlformats.org/presentationml/2006/main">
+  <p:cSld>
+    <p:spTree>
+      <p:nvGrpSpPr>
+        <p:cNvPr id="1" name=""/>
+        <p:cNvGrpSpPr/>
+        <p:nvPr/>
+      </p:nvGrpSpPr>
+      <p:grpSpPr>
+        <a:xfrm>
+          <a:off x="0" y="0"/>
+          <a:ext cx="0" cy="0"/>
+          <a:chOff x="0" y="0"/>
+          <a:chExt cx="0" cy="0"/>
+        </a:xfrm>
+      </p:grpSpPr>
+      <p:sp>
+        <p:nvSpPr>
+          <p:cNvPr id="2" name="Slide Image Placeholder 1"/>
+          <p:cNvSpPr>
+            <a:spLocks noGrp="1" noRot="1" noChangeAspect="1"/>
+          </p:cNvSpPr>
+          <p:nvPr>
+            <p:ph type="sldImg"/>
+          </p:nvPr>
+        </p:nvSpPr>
+        <p:spPr/>
+      </p:sp>
+      <p:sp>
+        <p:nvSpPr>
+          <p:cNvPr id="3" name="Notes Placeholder 2"/>
+          <p:cNvSpPr>
+            <a:spLocks noGrp="1"/>
+          </p:cNvSpPr>
+          <p:nvPr>
+            <p:ph type="body" idx="1"/>
+          </p:nvPr>
+        </p:nvSpPr>
+        <p:spPr/>
+        <p:txBody>
+          <a:bodyPr/>
+          <a:lstStyle/>
+          <a:p>
+            <a:r>
+              <a:rPr lang="en-US" dirty="0" smtClean="0"/>
+              <a:t>John</a:t>
+            </a:r>
+            <a:endParaRPr lang="en-US" dirty="0"/>
+          </a:p>
+        </p:txBody>
+      </p:sp>
+      <p:sp>
+        <p:nvSpPr>
+          <p:cNvPr id="4" name="Slide Number Placeholder 3"/>
+          <p:cNvSpPr>
+            <a:spLocks noGrp="1"/>
+          </p:cNvSpPr>
+          <p:nvPr>
+            <p:ph type="sldNum" sz="quarter" idx="10"/>
+          </p:nvPr>
+        </p:nvSpPr>
+        <p:spPr/>
+        <p:txBody>
+          <a:bodyPr/>
+          <a:lstStyle/>
+          <a:p>
+            <a:fld id="{F8AFB5CC-0D84-5843-99AB-223961A97626}" type="slidenum">
+              <a:rPr lang="en-US" smtClean="0"/>
+              <a:t>14</a:t>
+            </a:fld>
+            <a:endParaRPr lang="en-US"/>
+          </a:p>
+        </p:txBody>
+      </p:sp>
+    </p:spTree>
+    <p:extLst>
+      <p:ext uri="{BB962C8B-B14F-4D97-AF65-F5344CB8AC3E}">
+        <p14:creationId xmlns:p14="http://schemas.microsoft.com/office/powerpoint/2010/main" val="3898796213"/>
+      </p:ext>
+    </p:extLst>
+  </p:cSld>
+  <p:clrMapOvr>
+    <a:masterClrMapping/>
+  </p:clrMapOvr>
+</p:notes>
+</file>
+
+<file path=ppt/notesSlides/notesSlide15.xml><?xml version="1.0" encoding="utf-8"?>
+<p:notes xmlns:a="http://schemas.openxmlformats.org/drawingml/2006/main" xmlns:r="http://schemas.openxmlformats.org/officeDocument/2006/relationships" xmlns:p="http://schemas.openxmlformats.org/presentationml/2006/main">
+  <p:cSld>
+    <p:spTree>
+      <p:nvGrpSpPr>
+        <p:cNvPr id="1" name=""/>
+        <p:cNvGrpSpPr/>
+        <p:nvPr/>
+      </p:nvGrpSpPr>
+      <p:grpSpPr>
+        <a:xfrm>
+          <a:off x="0" y="0"/>
+          <a:ext cx="0" cy="0"/>
+          <a:chOff x="0" y="0"/>
+          <a:chExt cx="0" cy="0"/>
+        </a:xfrm>
+      </p:grpSpPr>
+      <p:sp>
+        <p:nvSpPr>
+          <p:cNvPr id="2" name="Slide Image Placeholder 1"/>
+          <p:cNvSpPr>
+            <a:spLocks noGrp="1" noRot="1" noChangeAspect="1"/>
+          </p:cNvSpPr>
+          <p:nvPr>
+            <p:ph type="sldImg"/>
+          </p:nvPr>
+        </p:nvSpPr>
+        <p:spPr>
+          <a:xfrm>
+            <a:off x="381000" y="685800"/>
+            <a:ext cx="6096000" cy="3429000"/>
+          </a:xfrm>
+        </p:spPr>
+      </p:sp>
+      <p:sp>
+        <p:nvSpPr>
+          <p:cNvPr id="3" name="Notes Placeholder 2"/>
+          <p:cNvSpPr>
+            <a:spLocks noGrp="1"/>
+          </p:cNvSpPr>
+          <p:nvPr>
+            <p:ph type="body" idx="1"/>
+          </p:nvPr>
+        </p:nvSpPr>
+        <p:spPr/>
+        <p:txBody>
+          <a:bodyPr/>
+          <a:lstStyle/>
+          <a:p>
+            <a:r>
+              <a:rPr lang="en-US" dirty="0" smtClean="0"/>
+              <a:t>John</a:t>
+            </a:r>
+            <a:endParaRPr lang="en-US" dirty="0"/>
+          </a:p>
+        </p:txBody>
+      </p:sp>
+      <p:sp>
+        <p:nvSpPr>
+          <p:cNvPr id="4" name="Slide Number Placeholder 3"/>
+          <p:cNvSpPr>
+            <a:spLocks noGrp="1"/>
+          </p:cNvSpPr>
+          <p:nvPr>
+            <p:ph type="sldNum" sz="quarter" idx="10"/>
+          </p:nvPr>
+        </p:nvSpPr>
+        <p:spPr/>
+        <p:txBody>
+          <a:bodyPr/>
+          <a:lstStyle/>
+          <a:p>
+            <a:fld id="{F8AFB5CC-0D84-5843-99AB-223961A97626}" type="slidenum">
+              <a:rPr lang="en-US" smtClean="0"/>
+              <a:t>15</a:t>
+            </a:fld>
+            <a:endParaRPr lang="en-US"/>
+          </a:p>
+        </p:txBody>
+      </p:sp>
+    </p:spTree>
+    <p:extLst>
+      <p:ext uri="{BB962C8B-B14F-4D97-AF65-F5344CB8AC3E}">
+        <p14:creationId xmlns:p14="http://schemas.microsoft.com/office/powerpoint/2010/main" val="1637485288"/>
       </p:ext>
     </p:extLst>
   </p:cSld>
@@ -798,12 +1374,7 @@
             <p:ph type="sldImg"/>
           </p:nvPr>
         </p:nvSpPr>
-        <p:spPr>
-          <a:xfrm>
-            <a:off x="381000" y="685800"/>
-            <a:ext cx="6096000" cy="3429000"/>
-          </a:xfrm>
-        </p:spPr>
+        <p:spPr/>
       </p:sp>
       <p:sp>
         <p:nvSpPr>
@@ -821,8 +1392,8 @@
           <a:lstStyle/>
           <a:p>
             <a:r>
-              <a:rPr lang="en-US" dirty="0" smtClean="0"/>
-              <a:t>Ernest</a:t>
+              <a:rPr lang="en-US" dirty="0" err="1" smtClean="0"/>
+              <a:t>Hieu</a:t>
             </a:r>
             <a:endParaRPr lang="en-US" dirty="0"/>
           </a:p>
@@ -845,7 +1416,7 @@
           <a:p>
             <a:fld id="{F8AFB5CC-0D84-5843-99AB-223961A97626}" type="slidenum">
               <a:rPr lang="en-US" smtClean="0"/>
-              <a:t>3</a:t>
+              <a:t>2</a:t>
             </a:fld>
             <a:endParaRPr lang="en-US"/>
           </a:p>
@@ -854,7 +1425,7 @@
     </p:spTree>
     <p:extLst>
       <p:ext uri="{BB962C8B-B14F-4D97-AF65-F5344CB8AC3E}">
-        <p14:creationId xmlns:p14="http://schemas.microsoft.com/office/powerpoint/2010/main" val="272466064"/>
+        <p14:creationId xmlns:p14="http://schemas.microsoft.com/office/powerpoint/2010/main" val="811150732"/>
       </p:ext>
     </p:extLst>
   </p:cSld>
@@ -914,8 +1485,8 @@
           <a:lstStyle/>
           <a:p>
             <a:r>
-              <a:rPr lang="en-US" dirty="0" smtClean="0"/>
-              <a:t>Aaron</a:t>
+              <a:rPr lang="en-US" dirty="0" err="1" smtClean="0"/>
+              <a:t>Hieu</a:t>
             </a:r>
             <a:endParaRPr lang="en-US" dirty="0"/>
           </a:p>
@@ -938,7 +1509,7 @@
           <a:p>
             <a:fld id="{F8AFB5CC-0D84-5843-99AB-223961A97626}" type="slidenum">
               <a:rPr lang="en-US" smtClean="0"/>
-              <a:t>8</a:t>
+              <a:t>3</a:t>
             </a:fld>
             <a:endParaRPr lang="en-US"/>
           </a:p>
@@ -947,7 +1518,7 @@
     </p:spTree>
     <p:extLst>
       <p:ext uri="{BB962C8B-B14F-4D97-AF65-F5344CB8AC3E}">
-        <p14:creationId xmlns:p14="http://schemas.microsoft.com/office/powerpoint/2010/main" val="1502231126"/>
+        <p14:creationId xmlns:p14="http://schemas.microsoft.com/office/powerpoint/2010/main" val="272466064"/>
       </p:ext>
     </p:extLst>
   </p:cSld>
@@ -984,6 +1555,181 @@
             <p:ph type="sldImg"/>
           </p:nvPr>
         </p:nvSpPr>
+        <p:spPr/>
+      </p:sp>
+      <p:sp>
+        <p:nvSpPr>
+          <p:cNvPr id="3" name="Notes Placeholder 2"/>
+          <p:cNvSpPr>
+            <a:spLocks noGrp="1"/>
+          </p:cNvSpPr>
+          <p:nvPr>
+            <p:ph type="body" idx="1"/>
+          </p:nvPr>
+        </p:nvSpPr>
+        <p:spPr/>
+        <p:txBody>
+          <a:bodyPr/>
+          <a:lstStyle/>
+          <a:p>
+            <a:r>
+              <a:rPr lang="en-US" dirty="0" err="1" smtClean="0"/>
+              <a:t>Hieu</a:t>
+            </a:r>
+            <a:endParaRPr lang="en-US" dirty="0"/>
+          </a:p>
+        </p:txBody>
+      </p:sp>
+      <p:sp>
+        <p:nvSpPr>
+          <p:cNvPr id="4" name="Slide Number Placeholder 3"/>
+          <p:cNvSpPr>
+            <a:spLocks noGrp="1"/>
+          </p:cNvSpPr>
+          <p:nvPr>
+            <p:ph type="sldNum" sz="quarter" idx="10"/>
+          </p:nvPr>
+        </p:nvSpPr>
+        <p:spPr/>
+        <p:txBody>
+          <a:bodyPr/>
+          <a:lstStyle/>
+          <a:p>
+            <a:fld id="{F8AFB5CC-0D84-5843-99AB-223961A97626}" type="slidenum">
+              <a:rPr lang="en-US" smtClean="0"/>
+              <a:t>4</a:t>
+            </a:fld>
+            <a:endParaRPr lang="en-US"/>
+          </a:p>
+        </p:txBody>
+      </p:sp>
+    </p:spTree>
+    <p:extLst>
+      <p:ext uri="{BB962C8B-B14F-4D97-AF65-F5344CB8AC3E}">
+        <p14:creationId xmlns:p14="http://schemas.microsoft.com/office/powerpoint/2010/main" val="2002210214"/>
+      </p:ext>
+    </p:extLst>
+  </p:cSld>
+  <p:clrMapOvr>
+    <a:masterClrMapping/>
+  </p:clrMapOvr>
+</p:notes>
+</file>
+
+<file path=ppt/notesSlides/notesSlide5.xml><?xml version="1.0" encoding="utf-8"?>
+<p:notes xmlns:a="http://schemas.openxmlformats.org/drawingml/2006/main" xmlns:r="http://schemas.openxmlformats.org/officeDocument/2006/relationships" xmlns:p="http://schemas.openxmlformats.org/presentationml/2006/main">
+  <p:cSld>
+    <p:spTree>
+      <p:nvGrpSpPr>
+        <p:cNvPr id="1" name=""/>
+        <p:cNvGrpSpPr/>
+        <p:nvPr/>
+      </p:nvGrpSpPr>
+      <p:grpSpPr>
+        <a:xfrm>
+          <a:off x="0" y="0"/>
+          <a:ext cx="0" cy="0"/>
+          <a:chOff x="0" y="0"/>
+          <a:chExt cx="0" cy="0"/>
+        </a:xfrm>
+      </p:grpSpPr>
+      <p:sp>
+        <p:nvSpPr>
+          <p:cNvPr id="2" name="Slide Image Placeholder 1"/>
+          <p:cNvSpPr>
+            <a:spLocks noGrp="1" noRot="1" noChangeAspect="1"/>
+          </p:cNvSpPr>
+          <p:nvPr>
+            <p:ph type="sldImg"/>
+          </p:nvPr>
+        </p:nvSpPr>
+        <p:spPr/>
+      </p:sp>
+      <p:sp>
+        <p:nvSpPr>
+          <p:cNvPr id="3" name="Notes Placeholder 2"/>
+          <p:cNvSpPr>
+            <a:spLocks noGrp="1"/>
+          </p:cNvSpPr>
+          <p:nvPr>
+            <p:ph type="body" idx="1"/>
+          </p:nvPr>
+        </p:nvSpPr>
+        <p:spPr/>
+        <p:txBody>
+          <a:bodyPr/>
+          <a:lstStyle/>
+          <a:p>
+            <a:r>
+              <a:rPr lang="en-US" dirty="0" smtClean="0"/>
+              <a:t>Wayne</a:t>
+            </a:r>
+          </a:p>
+        </p:txBody>
+      </p:sp>
+      <p:sp>
+        <p:nvSpPr>
+          <p:cNvPr id="4" name="Slide Number Placeholder 3"/>
+          <p:cNvSpPr>
+            <a:spLocks noGrp="1"/>
+          </p:cNvSpPr>
+          <p:nvPr>
+            <p:ph type="sldNum" sz="quarter" idx="10"/>
+          </p:nvPr>
+        </p:nvSpPr>
+        <p:spPr/>
+        <p:txBody>
+          <a:bodyPr/>
+          <a:lstStyle/>
+          <a:p>
+            <a:fld id="{F8AFB5CC-0D84-5843-99AB-223961A97626}" type="slidenum">
+              <a:rPr lang="en-US" smtClean="0"/>
+              <a:t>5</a:t>
+            </a:fld>
+            <a:endParaRPr lang="en-US"/>
+          </a:p>
+        </p:txBody>
+      </p:sp>
+    </p:spTree>
+    <p:extLst>
+      <p:ext uri="{BB962C8B-B14F-4D97-AF65-F5344CB8AC3E}">
+        <p14:creationId xmlns:p14="http://schemas.microsoft.com/office/powerpoint/2010/main" val="4163110577"/>
+      </p:ext>
+    </p:extLst>
+  </p:cSld>
+  <p:clrMapOvr>
+    <a:masterClrMapping/>
+  </p:clrMapOvr>
+</p:notes>
+</file>
+
+<file path=ppt/notesSlides/notesSlide6.xml><?xml version="1.0" encoding="utf-8"?>
+<p:notes xmlns:a="http://schemas.openxmlformats.org/drawingml/2006/main" xmlns:r="http://schemas.openxmlformats.org/officeDocument/2006/relationships" xmlns:p="http://schemas.openxmlformats.org/presentationml/2006/main">
+  <p:cSld>
+    <p:spTree>
+      <p:nvGrpSpPr>
+        <p:cNvPr id="1" name=""/>
+        <p:cNvGrpSpPr/>
+        <p:nvPr/>
+      </p:nvGrpSpPr>
+      <p:grpSpPr>
+        <a:xfrm>
+          <a:off x="0" y="0"/>
+          <a:ext cx="0" cy="0"/>
+          <a:chOff x="0" y="0"/>
+          <a:chExt cx="0" cy="0"/>
+        </a:xfrm>
+      </p:grpSpPr>
+      <p:sp>
+        <p:nvSpPr>
+          <p:cNvPr id="2" name="Slide Image Placeholder 1"/>
+          <p:cNvSpPr>
+            <a:spLocks noGrp="1" noRot="1" noChangeAspect="1"/>
+          </p:cNvSpPr>
+          <p:nvPr>
+            <p:ph type="sldImg"/>
+          </p:nvPr>
+        </p:nvSpPr>
         <p:spPr>
           <a:xfrm>
             <a:off x="381000" y="685800"/>
@@ -1031,7 +1777,7 @@
           <a:p>
             <a:fld id="{F8AFB5CC-0D84-5843-99AB-223961A97626}" type="slidenum">
               <a:rPr lang="en-US" smtClean="0"/>
-              <a:t>15</a:t>
+              <a:t>6</a:t>
             </a:fld>
             <a:endParaRPr lang="en-US"/>
           </a:p>
@@ -1040,7 +1786,309 @@
     </p:spTree>
     <p:extLst>
       <p:ext uri="{BB962C8B-B14F-4D97-AF65-F5344CB8AC3E}">
-        <p14:creationId xmlns:p14="http://schemas.microsoft.com/office/powerpoint/2010/main" val="1637485288"/>
+        <p14:creationId xmlns:p14="http://schemas.microsoft.com/office/powerpoint/2010/main" val="1502231126"/>
+      </p:ext>
+    </p:extLst>
+  </p:cSld>
+  <p:clrMapOvr>
+    <a:masterClrMapping/>
+  </p:clrMapOvr>
+</p:notes>
+</file>
+
+<file path=ppt/notesSlides/notesSlide7.xml><?xml version="1.0" encoding="utf-8"?>
+<p:notes xmlns:a="http://schemas.openxmlformats.org/drawingml/2006/main" xmlns:r="http://schemas.openxmlformats.org/officeDocument/2006/relationships" xmlns:p="http://schemas.openxmlformats.org/presentationml/2006/main">
+  <p:cSld>
+    <p:spTree>
+      <p:nvGrpSpPr>
+        <p:cNvPr id="1" name=""/>
+        <p:cNvGrpSpPr/>
+        <p:nvPr/>
+      </p:nvGrpSpPr>
+      <p:grpSpPr>
+        <a:xfrm>
+          <a:off x="0" y="0"/>
+          <a:ext cx="0" cy="0"/>
+          <a:chOff x="0" y="0"/>
+          <a:chExt cx="0" cy="0"/>
+        </a:xfrm>
+      </p:grpSpPr>
+      <p:sp>
+        <p:nvSpPr>
+          <p:cNvPr id="2" name="Slide Image Placeholder 1"/>
+          <p:cNvSpPr>
+            <a:spLocks noGrp="1" noRot="1" noChangeAspect="1"/>
+          </p:cNvSpPr>
+          <p:nvPr>
+            <p:ph type="sldImg"/>
+          </p:nvPr>
+        </p:nvSpPr>
+        <p:spPr/>
+      </p:sp>
+      <p:sp>
+        <p:nvSpPr>
+          <p:cNvPr id="3" name="Notes Placeholder 2"/>
+          <p:cNvSpPr>
+            <a:spLocks noGrp="1"/>
+          </p:cNvSpPr>
+          <p:nvPr>
+            <p:ph type="body" idx="1"/>
+          </p:nvPr>
+        </p:nvSpPr>
+        <p:spPr/>
+        <p:txBody>
+          <a:bodyPr/>
+          <a:lstStyle/>
+          <a:p>
+            <a:r>
+              <a:rPr lang="en-US" dirty="0" smtClean="0"/>
+              <a:t>Aaron</a:t>
+            </a:r>
+            <a:endParaRPr lang="en-US" dirty="0"/>
+          </a:p>
+        </p:txBody>
+      </p:sp>
+      <p:sp>
+        <p:nvSpPr>
+          <p:cNvPr id="4" name="Slide Number Placeholder 3"/>
+          <p:cNvSpPr>
+            <a:spLocks noGrp="1"/>
+          </p:cNvSpPr>
+          <p:nvPr>
+            <p:ph type="sldNum" sz="quarter" idx="10"/>
+          </p:nvPr>
+        </p:nvSpPr>
+        <p:spPr/>
+        <p:txBody>
+          <a:bodyPr/>
+          <a:lstStyle/>
+          <a:p>
+            <a:fld id="{F8AFB5CC-0D84-5843-99AB-223961A97626}" type="slidenum">
+              <a:rPr lang="en-US" smtClean="0"/>
+              <a:t>7</a:t>
+            </a:fld>
+            <a:endParaRPr lang="en-US"/>
+          </a:p>
+        </p:txBody>
+      </p:sp>
+    </p:spTree>
+    <p:extLst>
+      <p:ext uri="{BB962C8B-B14F-4D97-AF65-F5344CB8AC3E}">
+        <p14:creationId xmlns:p14="http://schemas.microsoft.com/office/powerpoint/2010/main" val="2270360030"/>
+      </p:ext>
+    </p:extLst>
+  </p:cSld>
+  <p:clrMapOvr>
+    <a:masterClrMapping/>
+  </p:clrMapOvr>
+</p:notes>
+</file>
+
+<file path=ppt/notesSlides/notesSlide8.xml><?xml version="1.0" encoding="utf-8"?>
+<p:notes xmlns:a="http://schemas.openxmlformats.org/drawingml/2006/main" xmlns:r="http://schemas.openxmlformats.org/officeDocument/2006/relationships" xmlns:p="http://schemas.openxmlformats.org/presentationml/2006/main">
+  <p:cSld>
+    <p:spTree>
+      <p:nvGrpSpPr>
+        <p:cNvPr id="1" name=""/>
+        <p:cNvGrpSpPr/>
+        <p:nvPr/>
+      </p:nvGrpSpPr>
+      <p:grpSpPr>
+        <a:xfrm>
+          <a:off x="0" y="0"/>
+          <a:ext cx="0" cy="0"/>
+          <a:chOff x="0" y="0"/>
+          <a:chExt cx="0" cy="0"/>
+        </a:xfrm>
+      </p:grpSpPr>
+      <p:sp>
+        <p:nvSpPr>
+          <p:cNvPr id="2" name="Slide Image Placeholder 1"/>
+          <p:cNvSpPr>
+            <a:spLocks noGrp="1" noRot="1" noChangeAspect="1"/>
+          </p:cNvSpPr>
+          <p:nvPr>
+            <p:ph type="sldImg"/>
+          </p:nvPr>
+        </p:nvSpPr>
+        <p:spPr/>
+      </p:sp>
+      <p:sp>
+        <p:nvSpPr>
+          <p:cNvPr id="3" name="Notes Placeholder 2"/>
+          <p:cNvSpPr>
+            <a:spLocks noGrp="1"/>
+          </p:cNvSpPr>
+          <p:nvPr>
+            <p:ph type="body" idx="1"/>
+          </p:nvPr>
+        </p:nvSpPr>
+        <p:spPr/>
+        <p:txBody>
+          <a:bodyPr/>
+          <a:lstStyle/>
+          <a:p>
+            <a:pPr marL="0" marR="0" indent="0" algn="l" defTabSz="457200" rtl="0" eaLnBrk="1" fontAlgn="auto" latinLnBrk="0" hangingPunct="1">
+              <a:lnSpc>
+                <a:spcPct val="100000"/>
+              </a:lnSpc>
+              <a:spcBef>
+                <a:spcPts val="0"/>
+              </a:spcBef>
+              <a:spcAft>
+                <a:spcPts val="0"/>
+              </a:spcAft>
+              <a:buClrTx/>
+              <a:buSzTx/>
+              <a:buFontTx/>
+              <a:buNone/>
+              <a:tabLst/>
+              <a:defRPr/>
+            </a:pPr>
+            <a:r>
+              <a:rPr lang="en-US" dirty="0" smtClean="0"/>
+              <a:t>Aaron</a:t>
+            </a:r>
+          </a:p>
+          <a:p>
+            <a:endParaRPr lang="en-US" dirty="0"/>
+          </a:p>
+        </p:txBody>
+      </p:sp>
+      <p:sp>
+        <p:nvSpPr>
+          <p:cNvPr id="4" name="Slide Number Placeholder 3"/>
+          <p:cNvSpPr>
+            <a:spLocks noGrp="1"/>
+          </p:cNvSpPr>
+          <p:nvPr>
+            <p:ph type="sldNum" sz="quarter" idx="10"/>
+          </p:nvPr>
+        </p:nvSpPr>
+        <p:spPr/>
+        <p:txBody>
+          <a:bodyPr/>
+          <a:lstStyle/>
+          <a:p>
+            <a:fld id="{F8AFB5CC-0D84-5843-99AB-223961A97626}" type="slidenum">
+              <a:rPr lang="en-US" smtClean="0"/>
+              <a:t>8</a:t>
+            </a:fld>
+            <a:endParaRPr lang="en-US"/>
+          </a:p>
+        </p:txBody>
+      </p:sp>
+    </p:spTree>
+    <p:extLst>
+      <p:ext uri="{BB962C8B-B14F-4D97-AF65-F5344CB8AC3E}">
+        <p14:creationId xmlns:p14="http://schemas.microsoft.com/office/powerpoint/2010/main" val="1150579819"/>
+      </p:ext>
+    </p:extLst>
+  </p:cSld>
+  <p:clrMapOvr>
+    <a:masterClrMapping/>
+  </p:clrMapOvr>
+</p:notes>
+</file>
+
+<file path=ppt/notesSlides/notesSlide9.xml><?xml version="1.0" encoding="utf-8"?>
+<p:notes xmlns:a="http://schemas.openxmlformats.org/drawingml/2006/main" xmlns:r="http://schemas.openxmlformats.org/officeDocument/2006/relationships" xmlns:p="http://schemas.openxmlformats.org/presentationml/2006/main">
+  <p:cSld>
+    <p:spTree>
+      <p:nvGrpSpPr>
+        <p:cNvPr id="1" name=""/>
+        <p:cNvGrpSpPr/>
+        <p:nvPr/>
+      </p:nvGrpSpPr>
+      <p:grpSpPr>
+        <a:xfrm>
+          <a:off x="0" y="0"/>
+          <a:ext cx="0" cy="0"/>
+          <a:chOff x="0" y="0"/>
+          <a:chExt cx="0" cy="0"/>
+        </a:xfrm>
+      </p:grpSpPr>
+      <p:sp>
+        <p:nvSpPr>
+          <p:cNvPr id="2" name="Slide Image Placeholder 1"/>
+          <p:cNvSpPr>
+            <a:spLocks noGrp="1" noRot="1" noChangeAspect="1"/>
+          </p:cNvSpPr>
+          <p:nvPr>
+            <p:ph type="sldImg"/>
+          </p:nvPr>
+        </p:nvSpPr>
+        <p:spPr/>
+      </p:sp>
+      <p:sp>
+        <p:nvSpPr>
+          <p:cNvPr id="3" name="Notes Placeholder 2"/>
+          <p:cNvSpPr>
+            <a:spLocks noGrp="1"/>
+          </p:cNvSpPr>
+          <p:nvPr>
+            <p:ph type="body" idx="1"/>
+          </p:nvPr>
+        </p:nvSpPr>
+        <p:spPr/>
+        <p:txBody>
+          <a:bodyPr/>
+          <a:lstStyle/>
+          <a:p>
+            <a:pPr marL="0" marR="0" indent="0" algn="l" defTabSz="457200" rtl="0" eaLnBrk="1" fontAlgn="auto" latinLnBrk="0" hangingPunct="1">
+              <a:lnSpc>
+                <a:spcPct val="100000"/>
+              </a:lnSpc>
+              <a:spcBef>
+                <a:spcPts val="0"/>
+              </a:spcBef>
+              <a:spcAft>
+                <a:spcPts val="0"/>
+              </a:spcAft>
+              <a:buClrTx/>
+              <a:buSzTx/>
+              <a:buFontTx/>
+              <a:buNone/>
+              <a:tabLst/>
+              <a:defRPr/>
+            </a:pPr>
+            <a:r>
+              <a:rPr lang="en-US" dirty="0" smtClean="0"/>
+              <a:t>Aaron</a:t>
+            </a:r>
+          </a:p>
+          <a:p>
+            <a:endParaRPr lang="en-US" dirty="0"/>
+          </a:p>
+        </p:txBody>
+      </p:sp>
+      <p:sp>
+        <p:nvSpPr>
+          <p:cNvPr id="4" name="Slide Number Placeholder 3"/>
+          <p:cNvSpPr>
+            <a:spLocks noGrp="1"/>
+          </p:cNvSpPr>
+          <p:nvPr>
+            <p:ph type="sldNum" sz="quarter" idx="10"/>
+          </p:nvPr>
+        </p:nvSpPr>
+        <p:spPr/>
+        <p:txBody>
+          <a:bodyPr/>
+          <a:lstStyle/>
+          <a:p>
+            <a:fld id="{F8AFB5CC-0D84-5843-99AB-223961A97626}" type="slidenum">
+              <a:rPr lang="en-US" smtClean="0"/>
+              <a:t>9</a:t>
+            </a:fld>
+            <a:endParaRPr lang="en-US"/>
+          </a:p>
+        </p:txBody>
+      </p:sp>
+    </p:spTree>
+    <p:extLst>
+      <p:ext uri="{BB962C8B-B14F-4D97-AF65-F5344CB8AC3E}">
+        <p14:creationId xmlns:p14="http://schemas.microsoft.com/office/powerpoint/2010/main" val="4119137039"/>
       </p:ext>
     </p:extLst>
   </p:cSld>
@@ -1133,7 +2181,7 @@
           <a:p>
             <a:fld id="{A2F0292D-1797-49A5-8D2D-8D50C72EF3CC}" type="datetimeFigureOut">
               <a:rPr lang="en-US" smtClean="0"/>
-              <a:t>11/3/2014</a:t>
+              <a:t>11/4/2014</a:t>
             </a:fld>
             <a:endParaRPr lang="en-US"/>
           </a:p>
@@ -1645,7 +2693,7 @@
           <a:p>
             <a:fld id="{A2F0292D-1797-49A5-8D2D-8D50C72EF3CC}" type="datetimeFigureOut">
               <a:rPr lang="en-US" smtClean="0"/>
-              <a:t>11/3/2014</a:t>
+              <a:t>11/4/2014</a:t>
             </a:fld>
             <a:endParaRPr lang="en-US"/>
           </a:p>
@@ -1851,7 +2899,7 @@
           <a:p>
             <a:fld id="{A2F0292D-1797-49A5-8D2D-8D50C72EF3CC}" type="datetimeFigureOut">
               <a:rPr lang="en-US" smtClean="0"/>
-              <a:t>11/3/2014</a:t>
+              <a:t>11/4/2014</a:t>
             </a:fld>
             <a:endParaRPr lang="en-US"/>
           </a:p>
@@ -2058,7 +3106,7 @@
           <a:p>
             <a:fld id="{A2F0292D-1797-49A5-8D2D-8D50C72EF3CC}" type="datetimeFigureOut">
               <a:rPr lang="en-US" smtClean="0"/>
-              <a:t>11/3/2014</a:t>
+              <a:t>11/4/2014</a:t>
             </a:fld>
             <a:endParaRPr lang="en-US"/>
           </a:p>
@@ -2367,7 +3415,7 @@
           <a:p>
             <a:fld id="{A2F0292D-1797-49A5-8D2D-8D50C72EF3CC}" type="datetimeFigureOut">
               <a:rPr lang="en-US" smtClean="0"/>
-              <a:t>11/3/2014</a:t>
+              <a:t>11/4/2014</a:t>
             </a:fld>
             <a:endParaRPr lang="en-US"/>
           </a:p>
@@ -2702,7 +3750,7 @@
           <a:p>
             <a:fld id="{A2F0292D-1797-49A5-8D2D-8D50C72EF3CC}" type="datetimeFigureOut">
               <a:rPr lang="en-US" smtClean="0"/>
-              <a:t>11/3/2014</a:t>
+              <a:t>11/4/2014</a:t>
             </a:fld>
             <a:endParaRPr lang="en-US"/>
           </a:p>
@@ -3155,7 +4203,7 @@
           <a:p>
             <a:fld id="{A2F0292D-1797-49A5-8D2D-8D50C72EF3CC}" type="datetimeFigureOut">
               <a:rPr lang="en-US" smtClean="0"/>
-              <a:t>11/3/2014</a:t>
+              <a:t>11/4/2014</a:t>
             </a:fld>
             <a:endParaRPr lang="en-US"/>
           </a:p>
@@ -3841,7 +4889,7 @@
           <a:p>
             <a:fld id="{A2F0292D-1797-49A5-8D2D-8D50C72EF3CC}" type="datetimeFigureOut">
               <a:rPr lang="en-US" smtClean="0"/>
-              <a:t>11/3/2014</a:t>
+              <a:t>11/4/2014</a:t>
             </a:fld>
             <a:endParaRPr lang="en-US"/>
           </a:p>
@@ -4025,7 +5073,7 @@
           <a:p>
             <a:fld id="{A2F0292D-1797-49A5-8D2D-8D50C72EF3CC}" type="datetimeFigureOut">
               <a:rPr lang="en-US" smtClean="0"/>
-              <a:t>11/3/2014</a:t>
+              <a:t>11/4/2014</a:t>
             </a:fld>
             <a:endParaRPr lang="en-US"/>
           </a:p>
@@ -4201,7 +5249,7 @@
           <a:p>
             <a:fld id="{A2F0292D-1797-49A5-8D2D-8D50C72EF3CC}" type="datetimeFigureOut">
               <a:rPr lang="en-US" smtClean="0"/>
-              <a:t>11/3/2014</a:t>
+              <a:t>11/4/2014</a:t>
             </a:fld>
             <a:endParaRPr lang="en-US"/>
           </a:p>
@@ -4268,7 +5316,7 @@
           <a:p>
             <a:fld id="{A2F0292D-1797-49A5-8D2D-8D50C72EF3CC}" type="datetimeFigureOut">
               <a:rPr lang="en-US" smtClean="0"/>
-              <a:t>11/3/2014</a:t>
+              <a:t>11/4/2014</a:t>
             </a:fld>
             <a:endParaRPr lang="en-US"/>
           </a:p>
@@ -4911,7 +5959,7 @@
           <a:p>
             <a:fld id="{A2F0292D-1797-49A5-8D2D-8D50C72EF3CC}" type="datetimeFigureOut">
               <a:rPr lang="en-US" smtClean="0"/>
-              <a:t>11/3/2014</a:t>
+              <a:t>11/4/2014</a:t>
             </a:fld>
             <a:endParaRPr lang="en-US"/>
           </a:p>
@@ -5315,7 +6363,7 @@
           <a:p>
             <a:fld id="{A2F0292D-1797-49A5-8D2D-8D50C72EF3CC}" type="datetimeFigureOut">
               <a:rPr lang="en-US" smtClean="0"/>
-              <a:t>11/3/2014</a:t>
+              <a:t>11/4/2014</a:t>
             </a:fld>
             <a:endParaRPr lang="en-US"/>
           </a:p>
@@ -5881,7 +6929,7 @@
           <a:p>
             <a:fld id="{A2F0292D-1797-49A5-8D2D-8D50C72EF3CC}" type="datetimeFigureOut">
               <a:rPr lang="en-US" smtClean="0"/>
-              <a:t>11/3/2014</a:t>
+              <a:t>11/4/2014</a:t>
             </a:fld>
             <a:endParaRPr lang="en-US"/>
           </a:p>
@@ -6023,7 +7071,7 @@
           <a:p>
             <a:fld id="{A2F0292D-1797-49A5-8D2D-8D50C72EF3CC}" type="datetimeFigureOut">
               <a:rPr lang="en-US" smtClean="0"/>
-              <a:t>11/3/2014</a:t>
+              <a:t>11/4/2014</a:t>
             </a:fld>
             <a:endParaRPr lang="en-US"/>
           </a:p>
@@ -6120,7 +7168,7 @@
           <a:p>
             <a:fld id="{A2F0292D-1797-49A5-8D2D-8D50C72EF3CC}" type="datetimeFigureOut">
               <a:rPr lang="en-US" smtClean="0"/>
-              <a:t>11/3/2014</a:t>
+              <a:t>11/4/2014</a:t>
             </a:fld>
             <a:endParaRPr lang="en-US"/>
           </a:p>
@@ -6397,7 +7445,7 @@
           <a:p>
             <a:fld id="{A2F0292D-1797-49A5-8D2D-8D50C72EF3CC}" type="datetimeFigureOut">
               <a:rPr lang="en-US" smtClean="0"/>
-              <a:t>11/3/2014</a:t>
+              <a:t>11/4/2014</a:t>
             </a:fld>
             <a:endParaRPr lang="en-US"/>
           </a:p>
@@ -6501,7 +7549,7 @@
           <a:p>
             <a:fld id="{A2F0292D-1797-49A5-8D2D-8D50C72EF3CC}" type="datetimeFigureOut">
               <a:rPr lang="en-US" smtClean="0"/>
-              <a:t>11/3/2014</a:t>
+              <a:t>11/4/2014</a:t>
             </a:fld>
             <a:endParaRPr lang="en-US"/>
           </a:p>
@@ -7226,7 +8274,7 @@
           <a:p>
             <a:r>
               <a:rPr lang="en-US" dirty="0" smtClean="0"/>
-              <a:t>Roadblocks</a:t>
+              <a:t>AI Algorithm - Recursion</a:t>
             </a:r>
             <a:endParaRPr lang="en-US" dirty="0"/>
           </a:p>
@@ -7248,28 +8296,62 @@
           <a:lstStyle/>
           <a:p>
             <a:r>
-              <a:rPr lang="en-US" dirty="0" smtClean="0"/>
-              <a:t>Delegates don’t exist in C++11</a:t>
-            </a:r>
-          </a:p>
-          <a:p>
-            <a:r>
-              <a:rPr lang="en-US" dirty="0" smtClean="0"/>
-              <a:t>Win-checking algorithm</a:t>
-            </a:r>
-          </a:p>
-          <a:p>
-            <a:r>
-              <a:rPr lang="en-US" dirty="0" smtClean="0"/>
-              <a:t>Bridging QML and C++</a:t>
-            </a:r>
+              <a:rPr lang="en-US" dirty="0" err="1" smtClean="0"/>
+              <a:t>minimax</a:t>
+            </a:r>
+            <a:r>
+              <a:rPr lang="en-US" dirty="0" smtClean="0"/>
+              <a:t> algorithm:</a:t>
+            </a:r>
+          </a:p>
+          <a:p>
+            <a:pPr lvl="1"/>
+            <a:r>
+              <a:rPr lang="en-US" dirty="0" smtClean="0"/>
+              <a:t>15,511,210,043,330,985,984,000,000</a:t>
+            </a:r>
+          </a:p>
+          <a:p>
+            <a:r>
+              <a:rPr lang="en-US" dirty="0" err="1" smtClean="0"/>
+              <a:t>minimax</a:t>
+            </a:r>
+            <a:r>
+              <a:rPr lang="en-US" dirty="0"/>
+              <a:t> </a:t>
+            </a:r>
+            <a:r>
+              <a:rPr lang="en-US" dirty="0" smtClean="0"/>
+              <a:t>with alpha-beta pruning:</a:t>
+            </a:r>
+          </a:p>
+          <a:p>
+            <a:pPr lvl="1"/>
+            <a:r>
+              <a:rPr lang="en-US" dirty="0" smtClean="0"/>
+              <a:t>6,204,484,017,332,394,393,600,000</a:t>
+            </a:r>
+          </a:p>
+          <a:p>
+            <a:r>
+              <a:rPr lang="en-US" dirty="0" smtClean="0"/>
+              <a:t>4stones algorithm:</a:t>
+            </a:r>
+          </a:p>
+          <a:p>
+            <a:pPr lvl="1"/>
+            <a:r>
+              <a:rPr lang="en-US" dirty="0" smtClean="0"/>
+              <a:t>maximum: 200</a:t>
+            </a:r>
+            <a:endParaRPr lang="en-US" dirty="0"/>
           </a:p>
         </p:txBody>
       </p:sp>
     </p:spTree>
     <p:extLst>
       <p:ext uri="{BB962C8B-B14F-4D97-AF65-F5344CB8AC3E}">
-        <p14:creationId xmlns:p14="http://schemas.microsoft.com/office/powerpoint/2010/main" val="4116196815"/>
+        <p14:creationId xmlns:p14="http://schemas.microsoft.com/office/powerpoint/2010/main" val="3078311744"/>
       </p:ext>
     </p:extLst>
   </p:cSld>
@@ -7320,7 +8402,7 @@
           <a:p>
             <a:r>
               <a:rPr lang="en-US" dirty="0" smtClean="0"/>
-              <a:t>AI Algorithm - Recursion</a:t>
+              <a:t>Roadblocks</a:t>
             </a:r>
             <a:endParaRPr lang="en-US" dirty="0"/>
           </a:p>
@@ -7342,62 +8424,28 @@
           <a:lstStyle/>
           <a:p>
             <a:r>
-              <a:rPr lang="en-US" dirty="0" err="1" smtClean="0"/>
-              <a:t>minimax</a:t>
-            </a:r>
-            <a:r>
-              <a:rPr lang="en-US" dirty="0" smtClean="0"/>
-              <a:t> algorithm:</a:t>
-            </a:r>
-          </a:p>
-          <a:p>
-            <a:pPr lvl="1"/>
-            <a:r>
-              <a:rPr lang="en-US" dirty="0" smtClean="0"/>
-              <a:t>15,511,210,043,330,985,984,000,000</a:t>
-            </a:r>
-          </a:p>
-          <a:p>
-            <a:r>
-              <a:rPr lang="en-US" dirty="0" err="1" smtClean="0"/>
-              <a:t>minimax</a:t>
-            </a:r>
-            <a:r>
-              <a:rPr lang="en-US" dirty="0"/>
-              <a:t> </a:t>
-            </a:r>
-            <a:r>
-              <a:rPr lang="en-US" dirty="0" smtClean="0"/>
-              <a:t>with alpha-beta pruning:</a:t>
-            </a:r>
-          </a:p>
-          <a:p>
-            <a:pPr lvl="1"/>
-            <a:r>
-              <a:rPr lang="en-US" dirty="0" smtClean="0"/>
-              <a:t>6,204,484,017,332,394,393,600,000</a:t>
-            </a:r>
-          </a:p>
-          <a:p>
-            <a:r>
-              <a:rPr lang="en-US" dirty="0" smtClean="0"/>
-              <a:t>4stones algorithm:</a:t>
-            </a:r>
-          </a:p>
-          <a:p>
-            <a:pPr lvl="1"/>
-            <a:r>
-              <a:rPr lang="en-US" dirty="0" smtClean="0"/>
-              <a:t>maximum: 200</a:t>
-            </a:r>
-            <a:endParaRPr lang="en-US" dirty="0"/>
+              <a:rPr lang="en-US" dirty="0" smtClean="0"/>
+              <a:t>Delegates don’t exist in C++11</a:t>
+            </a:r>
+          </a:p>
+          <a:p>
+            <a:r>
+              <a:rPr lang="en-US" dirty="0" smtClean="0"/>
+              <a:t>Win-checking algorithm</a:t>
+            </a:r>
+          </a:p>
+          <a:p>
+            <a:r>
+              <a:rPr lang="en-US" dirty="0" smtClean="0"/>
+              <a:t>Bridging QML and C++</a:t>
+            </a:r>
           </a:p>
         </p:txBody>
       </p:sp>
     </p:spTree>
     <p:extLst>
       <p:ext uri="{BB962C8B-B14F-4D97-AF65-F5344CB8AC3E}">
-        <p14:creationId xmlns:p14="http://schemas.microsoft.com/office/powerpoint/2010/main" val="3078311744"/>
+        <p14:creationId xmlns:p14="http://schemas.microsoft.com/office/powerpoint/2010/main" val="4116196815"/>
       </p:ext>
     </p:extLst>
   </p:cSld>
@@ -7783,15 +8831,7 @@
           <a:p>
             <a:r>
               <a:rPr lang="en-US" sz="2800" dirty="0" smtClean="0"/>
-              <a:t>Beta: November </a:t>
-            </a:r>
-            <a:r>
-              <a:rPr lang="en-US" sz="2800" dirty="0" smtClean="0"/>
-              <a:t>21, </a:t>
-            </a:r>
-            <a:r>
-              <a:rPr lang="en-US" sz="2800" dirty="0" smtClean="0"/>
-              <a:t>2014</a:t>
+              <a:t>Beta: November 21, 2014</a:t>
             </a:r>
           </a:p>
           <a:p>
@@ -7880,13 +8920,8 @@
           <a:p>
             <a:r>
               <a:rPr lang="en-US" dirty="0" smtClean="0"/>
-              <a:t>Defining the </a:t>
-            </a:r>
-            <a:r>
-              <a:rPr lang="en-US" dirty="0" smtClean="0"/>
-              <a:t>product</a:t>
-            </a:r>
-            <a:endParaRPr lang="en-US" dirty="0" smtClean="0"/>
+              <a:t>Defining the product</a:t>
+            </a:r>
           </a:p>
         </p:txBody>
       </p:sp>
@@ -8127,13 +9162,8 @@
           <a:p>
             <a:r>
               <a:rPr lang="en-US" dirty="0" smtClean="0"/>
-              <a:t>UI Customization (background</a:t>
-            </a:r>
-            <a:r>
-              <a:rPr lang="en-US" dirty="0" smtClean="0"/>
-              <a:t>)</a:t>
-            </a:r>
-            <a:endParaRPr lang="en-US" dirty="0" smtClean="0"/>
+              <a:t>UI Customization (background)</a:t>
+            </a:r>
           </a:p>
         </p:txBody>
       </p:sp>
@@ -8191,217 +9221,6 @@
           <a:p>
             <a:r>
               <a:rPr lang="en-US" dirty="0" smtClean="0"/>
-              <a:t>Database: Parse</a:t>
-            </a:r>
-            <a:endParaRPr lang="en-US" dirty="0"/>
-          </a:p>
-        </p:txBody>
-      </p:sp>
-      <p:sp>
-        <p:nvSpPr>
-          <p:cNvPr id="3" name="Content Placeholder 2"/>
-          <p:cNvSpPr>
-            <a:spLocks noGrp="1"/>
-          </p:cNvSpPr>
-          <p:nvPr>
-            <p:ph idx="1"/>
-          </p:nvPr>
-        </p:nvSpPr>
-        <p:spPr/>
-        <p:txBody>
-          <a:bodyPr/>
-          <a:lstStyle/>
-          <a:p>
-            <a:r>
-              <a:rPr lang="en-US" dirty="0" smtClean="0"/>
-              <a:t>Database service</a:t>
-            </a:r>
-          </a:p>
-          <a:p>
-            <a:r>
-              <a:rPr lang="en-US" dirty="0" smtClean="0"/>
-              <a:t>Easy to manage</a:t>
-            </a:r>
-          </a:p>
-          <a:p>
-            <a:r>
-              <a:rPr lang="en-US" dirty="0" smtClean="0"/>
-              <a:t>Highly flexible</a:t>
-            </a:r>
-          </a:p>
-          <a:p>
-            <a:r>
-              <a:rPr lang="en-US" dirty="0" smtClean="0"/>
-              <a:t>REST API</a:t>
-            </a:r>
-          </a:p>
-          <a:p>
-            <a:r>
-              <a:rPr lang="en-US" dirty="0" smtClean="0"/>
-              <a:t>JSON</a:t>
-            </a:r>
-            <a:endParaRPr lang="en-US" dirty="0"/>
-          </a:p>
-        </p:txBody>
-      </p:sp>
-    </p:spTree>
-    <p:extLst>
-      <p:ext uri="{BB962C8B-B14F-4D97-AF65-F5344CB8AC3E}">
-        <p14:creationId xmlns:p14="http://schemas.microsoft.com/office/powerpoint/2010/main" val="4057659267"/>
-      </p:ext>
-    </p:extLst>
-  </p:cSld>
-  <p:clrMapOvr>
-    <a:masterClrMapping/>
-  </p:clrMapOvr>
-  <p:timing>
-    <p:tnLst>
-      <p:par>
-        <p:cTn id="1" dur="indefinite" restart="never" nodeType="tmRoot"/>
-      </p:par>
-    </p:tnLst>
-  </p:timing>
-</p:sld>
-</file>
-
-<file path=ppt/slides/slide5.xml><?xml version="1.0" encoding="utf-8"?>
-<p:sld xmlns:a="http://schemas.openxmlformats.org/drawingml/2006/main" xmlns:r="http://schemas.openxmlformats.org/officeDocument/2006/relationships" xmlns:p="http://schemas.openxmlformats.org/presentationml/2006/main">
-  <p:cSld>
-    <p:spTree>
-      <p:nvGrpSpPr>
-        <p:cNvPr id="1" name=""/>
-        <p:cNvGrpSpPr/>
-        <p:nvPr/>
-      </p:nvGrpSpPr>
-      <p:grpSpPr>
-        <a:xfrm>
-          <a:off x="0" y="0"/>
-          <a:ext cx="0" cy="0"/>
-          <a:chOff x="0" y="0"/>
-          <a:chExt cx="0" cy="0"/>
-        </a:xfrm>
-      </p:grpSpPr>
-      <p:sp>
-        <p:nvSpPr>
-          <p:cNvPr id="5" name="Title 4"/>
-          <p:cNvSpPr>
-            <a:spLocks noGrp="1"/>
-          </p:cNvSpPr>
-          <p:nvPr>
-            <p:ph type="title"/>
-          </p:nvPr>
-        </p:nvSpPr>
-        <p:spPr/>
-        <p:txBody>
-          <a:bodyPr/>
-          <a:lstStyle/>
-          <a:p>
-            <a:r>
-              <a:rPr lang="en-US" dirty="0" smtClean="0"/>
-              <a:t>Login</a:t>
-            </a:r>
-            <a:endParaRPr lang="en-US" dirty="0"/>
-          </a:p>
-        </p:txBody>
-      </p:sp>
-      <p:sp>
-        <p:nvSpPr>
-          <p:cNvPr id="6" name="Content Placeholder 5"/>
-          <p:cNvSpPr>
-            <a:spLocks noGrp="1"/>
-          </p:cNvSpPr>
-          <p:nvPr>
-            <p:ph idx="1"/>
-          </p:nvPr>
-        </p:nvSpPr>
-        <p:spPr/>
-        <p:txBody>
-          <a:bodyPr/>
-          <a:lstStyle/>
-          <a:p>
-            <a:r>
-              <a:rPr lang="en-US" dirty="0" smtClean="0"/>
-              <a:t>Username only</a:t>
-            </a:r>
-          </a:p>
-          <a:p>
-            <a:r>
-              <a:rPr lang="en-US" dirty="0" smtClean="0"/>
-              <a:t>Privacy</a:t>
-            </a:r>
-          </a:p>
-          <a:p>
-            <a:r>
-              <a:rPr lang="en-US" dirty="0" smtClean="0"/>
-              <a:t>Simplicity</a:t>
-            </a:r>
-          </a:p>
-          <a:p>
-            <a:r>
-              <a:rPr lang="en-US" dirty="0" smtClean="0"/>
-              <a:t>Reduce</a:t>
-            </a:r>
-            <a:r>
-              <a:rPr lang="en-US" baseline="0" dirty="0" smtClean="0"/>
-              <a:t>d database overhead</a:t>
-            </a:r>
-          </a:p>
-        </p:txBody>
-      </p:sp>
-    </p:spTree>
-    <p:extLst>
-      <p:ext uri="{BB962C8B-B14F-4D97-AF65-F5344CB8AC3E}">
-        <p14:creationId xmlns:p14="http://schemas.microsoft.com/office/powerpoint/2010/main" val="179113061"/>
-      </p:ext>
-    </p:extLst>
-  </p:cSld>
-  <p:clrMapOvr>
-    <a:masterClrMapping/>
-  </p:clrMapOvr>
-  <p:timing>
-    <p:tnLst>
-      <p:par>
-        <p:cTn id="1" dur="indefinite" restart="never" nodeType="tmRoot"/>
-      </p:par>
-    </p:tnLst>
-  </p:timing>
-</p:sld>
-</file>
-
-<file path=ppt/slides/slide6.xml><?xml version="1.0" encoding="utf-8"?>
-<p:sld xmlns:a="http://schemas.openxmlformats.org/drawingml/2006/main" xmlns:r="http://schemas.openxmlformats.org/officeDocument/2006/relationships" xmlns:p="http://schemas.openxmlformats.org/presentationml/2006/main">
-  <p:cSld>
-    <p:spTree>
-      <p:nvGrpSpPr>
-        <p:cNvPr id="1" name=""/>
-        <p:cNvGrpSpPr/>
-        <p:nvPr/>
-      </p:nvGrpSpPr>
-      <p:grpSpPr>
-        <a:xfrm>
-          <a:off x="0" y="0"/>
-          <a:ext cx="0" cy="0"/>
-          <a:chOff x="0" y="0"/>
-          <a:chExt cx="0" cy="0"/>
-        </a:xfrm>
-      </p:grpSpPr>
-      <p:sp>
-        <p:nvSpPr>
-          <p:cNvPr id="2" name="Title 1"/>
-          <p:cNvSpPr>
-            <a:spLocks noGrp="1"/>
-          </p:cNvSpPr>
-          <p:nvPr>
-            <p:ph type="title"/>
-          </p:nvPr>
-        </p:nvSpPr>
-        <p:spPr/>
-        <p:txBody>
-          <a:bodyPr/>
-          <a:lstStyle/>
-          <a:p>
-            <a:r>
-              <a:rPr lang="en-US" dirty="0" smtClean="0"/>
               <a:t>Diagrams</a:t>
             </a:r>
             <a:endParaRPr lang="en-US" dirty="0"/>
@@ -8535,7 +9354,7 @@
           <p:nvPr/>
         </p:nvPicPr>
         <p:blipFill>
-          <a:blip r:embed="rId2" cstate="email">
+          <a:blip r:embed="rId3" cstate="email">
             <a:extLst>
               <a:ext uri="{28A0092B-C50C-407E-A947-70E740481C1C}">
                 <a14:useLocalDpi xmlns:a14="http://schemas.microsoft.com/office/drawing/2010/main" val="0"/>
@@ -8610,6 +9429,231 @@
 </p:sld>
 </file>
 
+<file path=ppt/slides/slide5.xml><?xml version="1.0" encoding="utf-8"?>
+<p:sld xmlns:a="http://schemas.openxmlformats.org/drawingml/2006/main" xmlns:r="http://schemas.openxmlformats.org/officeDocument/2006/relationships" xmlns:p="http://schemas.openxmlformats.org/presentationml/2006/main">
+  <p:cSld>
+    <p:spTree>
+      <p:nvGrpSpPr>
+        <p:cNvPr id="1" name=""/>
+        <p:cNvGrpSpPr/>
+        <p:nvPr/>
+      </p:nvGrpSpPr>
+      <p:grpSpPr>
+        <a:xfrm>
+          <a:off x="0" y="0"/>
+          <a:ext cx="0" cy="0"/>
+          <a:chOff x="0" y="0"/>
+          <a:chExt cx="0" cy="0"/>
+        </a:xfrm>
+      </p:grpSpPr>
+      <p:sp>
+        <p:nvSpPr>
+          <p:cNvPr id="4" name="Title 3"/>
+          <p:cNvSpPr>
+            <a:spLocks noGrp="1"/>
+          </p:cNvSpPr>
+          <p:nvPr>
+            <p:ph type="title"/>
+          </p:nvPr>
+        </p:nvSpPr>
+        <p:spPr/>
+        <p:txBody>
+          <a:bodyPr/>
+          <a:lstStyle/>
+          <a:p>
+            <a:r>
+              <a:rPr lang="en-US" dirty="0" smtClean="0"/>
+              <a:t>Project Management</a:t>
+            </a:r>
+            <a:endParaRPr lang="en-US" dirty="0"/>
+          </a:p>
+        </p:txBody>
+      </p:sp>
+      <p:sp>
+        <p:nvSpPr>
+          <p:cNvPr id="5" name="Text Placeholder 4"/>
+          <p:cNvSpPr>
+            <a:spLocks noGrp="1"/>
+          </p:cNvSpPr>
+          <p:nvPr>
+            <p:ph type="body" idx="1"/>
+          </p:nvPr>
+        </p:nvSpPr>
+        <p:spPr/>
+        <p:txBody>
+          <a:bodyPr/>
+          <a:lstStyle/>
+          <a:p>
+            <a:r>
+              <a:rPr lang="en-US" dirty="0" smtClean="0"/>
+              <a:t>Stepping Stones</a:t>
+            </a:r>
+            <a:endParaRPr lang="en-US" dirty="0"/>
+          </a:p>
+        </p:txBody>
+      </p:sp>
+    </p:spTree>
+    <p:extLst>
+      <p:ext uri="{BB962C8B-B14F-4D97-AF65-F5344CB8AC3E}">
+        <p14:creationId xmlns:p14="http://schemas.microsoft.com/office/powerpoint/2010/main" val="3866726300"/>
+      </p:ext>
+    </p:extLst>
+  </p:cSld>
+  <p:clrMapOvr>
+    <a:masterClrMapping/>
+  </p:clrMapOvr>
+  <p:timing>
+    <p:tnLst>
+      <p:par>
+        <p:cTn id="1" dur="indefinite" restart="never" nodeType="tmRoot"/>
+      </p:par>
+    </p:tnLst>
+  </p:timing>
+</p:sld>
+</file>
+
+<file path=ppt/slides/slide6.xml><?xml version="1.0" encoding="utf-8"?>
+<p:sld xmlns:a="http://schemas.openxmlformats.org/drawingml/2006/main" xmlns:r="http://schemas.openxmlformats.org/officeDocument/2006/relationships" xmlns:p="http://schemas.openxmlformats.org/presentationml/2006/main">
+  <p:cSld>
+    <p:spTree>
+      <p:nvGrpSpPr>
+        <p:cNvPr id="1" name=""/>
+        <p:cNvGrpSpPr/>
+        <p:nvPr/>
+      </p:nvGrpSpPr>
+      <p:grpSpPr>
+        <a:xfrm>
+          <a:off x="0" y="0"/>
+          <a:ext cx="0" cy="0"/>
+          <a:chOff x="0" y="0"/>
+          <a:chExt cx="0" cy="0"/>
+        </a:xfrm>
+      </p:grpSpPr>
+      <p:sp>
+        <p:nvSpPr>
+          <p:cNvPr id="4" name="Title 3"/>
+          <p:cNvSpPr>
+            <a:spLocks noGrp="1"/>
+          </p:cNvSpPr>
+          <p:nvPr>
+            <p:ph type="title"/>
+          </p:nvPr>
+        </p:nvSpPr>
+        <p:spPr/>
+        <p:txBody>
+          <a:bodyPr/>
+          <a:lstStyle/>
+          <a:p>
+            <a:r>
+              <a:rPr lang="en-US" dirty="0" smtClean="0"/>
+              <a:t>Communication</a:t>
+            </a:r>
+            <a:endParaRPr lang="en-US" dirty="0"/>
+          </a:p>
+        </p:txBody>
+      </p:sp>
+      <p:sp>
+        <p:nvSpPr>
+          <p:cNvPr id="5" name="Content Placeholder 4"/>
+          <p:cNvSpPr>
+            <a:spLocks noGrp="1"/>
+          </p:cNvSpPr>
+          <p:nvPr>
+            <p:ph idx="1"/>
+          </p:nvPr>
+        </p:nvSpPr>
+        <p:spPr/>
+        <p:txBody>
+          <a:bodyPr>
+            <a:normAutofit fontScale="92500" lnSpcReduction="20000"/>
+          </a:bodyPr>
+          <a:lstStyle/>
+          <a:p>
+            <a:r>
+              <a:rPr lang="en-US" dirty="0" smtClean="0"/>
+              <a:t>Face-to-face meetings Tuesdays at 5:45pm</a:t>
+            </a:r>
+          </a:p>
+          <a:p>
+            <a:r>
+              <a:rPr lang="en-US" dirty="0" smtClean="0"/>
+              <a:t>SMS</a:t>
+            </a:r>
+          </a:p>
+          <a:p>
+            <a:r>
+              <a:rPr lang="en-US" dirty="0" smtClean="0"/>
+              <a:t>Email</a:t>
+            </a:r>
+          </a:p>
+          <a:p>
+            <a:r>
+              <a:rPr lang="en-US" dirty="0" err="1" smtClean="0"/>
+              <a:t>Trello</a:t>
+            </a:r>
+            <a:endParaRPr lang="en-US" dirty="0" smtClean="0"/>
+          </a:p>
+          <a:p>
+            <a:r>
+              <a:rPr lang="en-US" dirty="0" smtClean="0">
+                <a:solidFill>
+                  <a:schemeClr val="bg1">
+                    <a:lumMod val="75000"/>
+                  </a:schemeClr>
+                </a:solidFill>
+              </a:rPr>
+              <a:t>Documents shared via OneDrive, Google Drive, and </a:t>
+            </a:r>
+            <a:r>
+              <a:rPr lang="en-US" dirty="0" err="1" smtClean="0">
+                <a:solidFill>
+                  <a:schemeClr val="bg1">
+                    <a:lumMod val="75000"/>
+                  </a:schemeClr>
+                </a:solidFill>
+              </a:rPr>
+              <a:t>Trello</a:t>
+            </a:r>
+            <a:endParaRPr lang="en-US" dirty="0" smtClean="0">
+              <a:solidFill>
+                <a:schemeClr val="bg1">
+                  <a:lumMod val="75000"/>
+                </a:schemeClr>
+              </a:solidFill>
+            </a:endParaRPr>
+          </a:p>
+          <a:p>
+            <a:r>
+              <a:rPr lang="en-US" dirty="0" smtClean="0"/>
+              <a:t>GitHub.com</a:t>
+            </a:r>
+            <a:r>
+              <a:rPr lang="en-US" baseline="0" dirty="0" smtClean="0"/>
+              <a:t> for issue-tracking and document storage</a:t>
+            </a:r>
+          </a:p>
+        </p:txBody>
+      </p:sp>
+    </p:spTree>
+    <p:extLst>
+      <p:ext uri="{BB962C8B-B14F-4D97-AF65-F5344CB8AC3E}">
+        <p14:creationId xmlns:p14="http://schemas.microsoft.com/office/powerpoint/2010/main" val="239307513"/>
+      </p:ext>
+    </p:extLst>
+  </p:cSld>
+  <p:clrMapOvr>
+    <a:masterClrMapping/>
+  </p:clrMapOvr>
+  <p:timing>
+    <p:tnLst>
+      <p:par>
+        <p:cTn id="1" dur="indefinite" restart="never" nodeType="tmRoot"/>
+      </p:par>
+    </p:tnLst>
+  </p:timing>
+</p:sld>
+</file>
+
 <file path=ppt/slides/slide7.xml><?xml version="1.0" encoding="utf-8"?>
 <p:sld xmlns:a="http://schemas.openxmlformats.org/drawingml/2006/main" xmlns:r="http://schemas.openxmlformats.org/officeDocument/2006/relationships" xmlns:p="http://schemas.openxmlformats.org/presentationml/2006/main">
   <p:cSld>
@@ -8629,7 +9673,7 @@
       </p:grpSpPr>
       <p:sp>
         <p:nvSpPr>
-          <p:cNvPr id="4" name="Title 3"/>
+          <p:cNvPr id="2" name="Title 1"/>
           <p:cNvSpPr>
             <a:spLocks noGrp="1"/>
           </p:cNvSpPr>
@@ -8644,7 +9688,7 @@
           <a:p>
             <a:r>
               <a:rPr lang="en-US" dirty="0" smtClean="0"/>
-              <a:t>Project Management</a:t>
+              <a:t>Technical Design</a:t>
             </a:r>
             <a:endParaRPr lang="en-US" dirty="0"/>
           </a:p>
@@ -8652,7 +9696,7 @@
       </p:sp>
       <p:sp>
         <p:nvSpPr>
-          <p:cNvPr id="5" name="Text Placeholder 4"/>
+          <p:cNvPr id="3" name="Text Placeholder 2"/>
           <p:cNvSpPr>
             <a:spLocks noGrp="1"/>
           </p:cNvSpPr>
@@ -8665,18 +9709,14 @@
           <a:bodyPr/>
           <a:lstStyle/>
           <a:p>
-            <a:r>
-              <a:rPr lang="en-US" dirty="0" smtClean="0"/>
-              <a:t>Stepping Stones</a:t>
-            </a:r>
-            <a:endParaRPr lang="en-US" dirty="0"/>
+            <a:endParaRPr lang="en-US"/>
           </a:p>
         </p:txBody>
       </p:sp>
     </p:spTree>
     <p:extLst>
       <p:ext uri="{BB962C8B-B14F-4D97-AF65-F5344CB8AC3E}">
-        <p14:creationId xmlns:p14="http://schemas.microsoft.com/office/powerpoint/2010/main" val="3866726300"/>
+        <p14:creationId xmlns:p14="http://schemas.microsoft.com/office/powerpoint/2010/main" val="4233104283"/>
       </p:ext>
     </p:extLst>
   </p:cSld>
@@ -8712,7 +9752,7 @@
       </p:grpSpPr>
       <p:sp>
         <p:nvSpPr>
-          <p:cNvPr id="4" name="Title 3"/>
+          <p:cNvPr id="5" name="Title 4"/>
           <p:cNvSpPr>
             <a:spLocks noGrp="1"/>
           </p:cNvSpPr>
@@ -8727,7 +9767,7 @@
           <a:p>
             <a:r>
               <a:rPr lang="en-US" dirty="0" smtClean="0"/>
-              <a:t>Communication</a:t>
+              <a:t>Login</a:t>
             </a:r>
             <a:endParaRPr lang="en-US" dirty="0"/>
           </a:p>
@@ -8735,7 +9775,7 @@
       </p:sp>
       <p:sp>
         <p:nvSpPr>
-          <p:cNvPr id="5" name="Content Placeholder 4"/>
+          <p:cNvPr id="6" name="Content Placeholder 5"/>
           <p:cNvSpPr>
             <a:spLocks noGrp="1"/>
           </p:cNvSpPr>
@@ -8745,77 +9785,34 @@
         </p:nvSpPr>
         <p:spPr/>
         <p:txBody>
-          <a:bodyPr>
-            <a:normAutofit fontScale="92500" lnSpcReduction="20000"/>
-          </a:bodyPr>
-          <a:lstStyle/>
-          <a:p>
-            <a:r>
-              <a:rPr lang="en-US" dirty="0" smtClean="0"/>
-              <a:t>Face-to-face meetings Tuesdays </a:t>
-            </a:r>
-            <a:r>
-              <a:rPr lang="en-US" dirty="0" smtClean="0"/>
-              <a:t>at 5:45pm</a:t>
-            </a:r>
-            <a:endParaRPr lang="en-US" dirty="0" smtClean="0"/>
-          </a:p>
-          <a:p>
-            <a:r>
-              <a:rPr lang="en-US" dirty="0" smtClean="0"/>
-              <a:t>SMS</a:t>
-            </a:r>
-          </a:p>
-          <a:p>
-            <a:r>
-              <a:rPr lang="en-US" dirty="0" smtClean="0"/>
-              <a:t>Email</a:t>
-            </a:r>
-          </a:p>
-          <a:p>
-            <a:r>
-              <a:rPr lang="en-US" dirty="0" err="1" smtClean="0"/>
-              <a:t>Trello</a:t>
-            </a:r>
-            <a:endParaRPr lang="en-US" dirty="0" smtClean="0"/>
-          </a:p>
-          <a:p>
-            <a:r>
-              <a:rPr lang="en-US" dirty="0" smtClean="0">
-                <a:solidFill>
-                  <a:schemeClr val="bg1">
-                    <a:lumMod val="75000"/>
-                  </a:schemeClr>
-                </a:solidFill>
-              </a:rPr>
-              <a:t>Documents shared via OneDrive, Google Drive, and </a:t>
-            </a:r>
-            <a:r>
-              <a:rPr lang="en-US" dirty="0" err="1" smtClean="0">
-                <a:solidFill>
-                  <a:schemeClr val="bg1">
-                    <a:lumMod val="75000"/>
-                  </a:schemeClr>
-                </a:solidFill>
-              </a:rPr>
-              <a:t>Trello</a:t>
-            </a:r>
-            <a:endParaRPr lang="en-US" dirty="0" smtClean="0">
-              <a:solidFill>
-                <a:schemeClr val="bg1">
-                  <a:lumMod val="75000"/>
-                </a:schemeClr>
-              </a:solidFill>
-            </a:endParaRPr>
-          </a:p>
-          <a:p>
-            <a:r>
-              <a:rPr lang="en-US" dirty="0" smtClean="0"/>
-              <a:t>GitHub.com</a:t>
+          <a:bodyPr/>
+          <a:lstStyle/>
+          <a:p>
+            <a:r>
+              <a:rPr lang="en-US" dirty="0" smtClean="0"/>
+              <a:t>Username only</a:t>
+            </a:r>
+          </a:p>
+          <a:p>
+            <a:r>
+              <a:rPr lang="en-US" dirty="0" smtClean="0"/>
+              <a:t>Privacy</a:t>
+            </a:r>
+          </a:p>
+          <a:p>
+            <a:r>
+              <a:rPr lang="en-US" dirty="0" smtClean="0"/>
+              <a:t>Simplicity</a:t>
+            </a:r>
+          </a:p>
+          <a:p>
+            <a:r>
+              <a:rPr lang="en-US" dirty="0" smtClean="0"/>
+              <a:t>Reduce</a:t>
             </a:r>
             <a:r>
               <a:rPr lang="en-US" baseline="0" dirty="0" smtClean="0"/>
-              <a:t> for issue-tracking and document storage</a:t>
+              <a:t>d database overhead</a:t>
             </a:r>
           </a:p>
         </p:txBody>
@@ -8823,7 +9820,7 @@
     </p:spTree>
     <p:extLst>
       <p:ext uri="{BB962C8B-B14F-4D97-AF65-F5344CB8AC3E}">
-        <p14:creationId xmlns:p14="http://schemas.microsoft.com/office/powerpoint/2010/main" val="239307513"/>
+        <p14:creationId xmlns:p14="http://schemas.microsoft.com/office/powerpoint/2010/main" val="179113061"/>
       </p:ext>
     </p:extLst>
   </p:cSld>
@@ -8874,7 +9871,7 @@
           <a:p>
             <a:r>
               <a:rPr lang="en-US" dirty="0" smtClean="0"/>
-              <a:t>Technical Design</a:t>
+              <a:t>Database: Parse</a:t>
             </a:r>
             <a:endParaRPr lang="en-US" dirty="0"/>
           </a:p>
@@ -8882,12 +9879,12 @@
       </p:sp>
       <p:sp>
         <p:nvSpPr>
-          <p:cNvPr id="3" name="Text Placeholder 2"/>
-          <p:cNvSpPr>
-            <a:spLocks noGrp="1"/>
-          </p:cNvSpPr>
-          <p:nvPr>
-            <p:ph type="body" idx="1"/>
+          <p:cNvPr id="3" name="Content Placeholder 2"/>
+          <p:cNvSpPr>
+            <a:spLocks noGrp="1"/>
+          </p:cNvSpPr>
+          <p:nvPr>
+            <p:ph idx="1"/>
           </p:nvPr>
         </p:nvSpPr>
         <p:spPr/>
@@ -8895,14 +9892,42 @@
           <a:bodyPr/>
           <a:lstStyle/>
           <a:p>
-            <a:endParaRPr lang="en-US"/>
+            <a:r>
+              <a:rPr lang="en-US" dirty="0" smtClean="0"/>
+              <a:t>Database service</a:t>
+            </a:r>
+          </a:p>
+          <a:p>
+            <a:r>
+              <a:rPr lang="en-US" dirty="0" smtClean="0"/>
+              <a:t>Easy to manage</a:t>
+            </a:r>
+          </a:p>
+          <a:p>
+            <a:r>
+              <a:rPr lang="en-US" dirty="0" smtClean="0"/>
+              <a:t>Highly flexible</a:t>
+            </a:r>
+          </a:p>
+          <a:p>
+            <a:r>
+              <a:rPr lang="en-US" dirty="0" smtClean="0"/>
+              <a:t>REST API</a:t>
+            </a:r>
+          </a:p>
+          <a:p>
+            <a:r>
+              <a:rPr lang="en-US" dirty="0" smtClean="0"/>
+              <a:t>JSON</a:t>
+            </a:r>
+            <a:endParaRPr lang="en-US" dirty="0"/>
           </a:p>
         </p:txBody>
       </p:sp>
     </p:spTree>
     <p:extLst>
       <p:ext uri="{BB962C8B-B14F-4D97-AF65-F5344CB8AC3E}">
-        <p14:creationId xmlns:p14="http://schemas.microsoft.com/office/powerpoint/2010/main" val="4233104283"/>
+        <p14:creationId xmlns:p14="http://schemas.microsoft.com/office/powerpoint/2010/main" val="4057659267"/>
       </p:ext>
     </p:extLst>
   </p:cSld>

</xml_diff>